<commit_message>
overall title for presentation mostly complete
</commit_message>
<xml_diff>
--- a/presentation/civic_duty_presentation.pptx
+++ b/presentation/civic_duty_presentation.pptx
@@ -5,10 +5,10 @@
     <p:sldMasterId id="2147483684" r:id="rId1"/>
   </p:sldMasterIdLst>
   <p:notesMasterIdLst>
-    <p:notesMasterId r:id="rId9"/>
+    <p:notesMasterId r:id="rId19"/>
   </p:notesMasterIdLst>
   <p:handoutMasterIdLst>
-    <p:handoutMasterId r:id="rId10"/>
+    <p:handoutMasterId r:id="rId20"/>
   </p:handoutMasterIdLst>
   <p:sldIdLst>
     <p:sldId id="280" r:id="rId2"/>
@@ -18,6 +18,16 @@
     <p:sldId id="284" r:id="rId6"/>
     <p:sldId id="285" r:id="rId7"/>
     <p:sldId id="286" r:id="rId8"/>
+    <p:sldId id="287" r:id="rId9"/>
+    <p:sldId id="288" r:id="rId10"/>
+    <p:sldId id="289" r:id="rId11"/>
+    <p:sldId id="290" r:id="rId12"/>
+    <p:sldId id="291" r:id="rId13"/>
+    <p:sldId id="292" r:id="rId14"/>
+    <p:sldId id="293" r:id="rId15"/>
+    <p:sldId id="294" r:id="rId16"/>
+    <p:sldId id="295" r:id="rId17"/>
+    <p:sldId id="296" r:id="rId18"/>
   </p:sldIdLst>
   <p:sldSz cx="12192000" cy="6858000"/>
   <p:notesSz cx="6858000" cy="9144000"/>
@@ -220,7 +230,7 @@
           <a:p>
             <a:fld id="{E5CB2E47-6F41-409B-AD22-834AE1EFF186}" type="datetimeFigureOut">
               <a:rPr lang="en-US" smtClean="0"/>
-              <a:t>7/21/2018</a:t>
+              <a:t>7/22/2018</a:t>
             </a:fld>
             <a:endParaRPr lang="en-US" dirty="0"/>
           </a:p>
@@ -385,7 +395,7 @@
           <a:p>
             <a:fld id="{FAD6744A-403D-42A1-BFE7-61DA46EE7C6C}" type="datetimeFigureOut">
               <a:rPr lang="en-US" smtClean="0"/>
-              <a:t>7/21/2018</a:t>
+              <a:t>7/22/2018</a:t>
             </a:fld>
             <a:endParaRPr lang="en-US" dirty="0"/>
           </a:p>
@@ -1081,7 +1091,7 @@
           <a:p>
             <a:fld id="{349BF3EA-1A78-4F07-BDC0-C8A1BD461199}" type="datetimeFigureOut">
               <a:rPr lang="en-US" smtClean="0"/>
-              <a:t>7/21/2018</a:t>
+              <a:t>7/22/2018</a:t>
             </a:fld>
             <a:endParaRPr lang="en-US" dirty="0"/>
           </a:p>
@@ -1273,7 +1283,7 @@
           <a:p>
             <a:fld id="{349BF3EA-1A78-4F07-BDC0-C8A1BD461199}" type="datetimeFigureOut">
               <a:rPr lang="en-US" smtClean="0"/>
-              <a:t>7/21/2018</a:t>
+              <a:t>7/22/2018</a:t>
             </a:fld>
             <a:endParaRPr lang="en-US" dirty="0"/>
           </a:p>
@@ -1475,7 +1485,7 @@
           <a:p>
             <a:fld id="{349BF3EA-1A78-4F07-BDC0-C8A1BD461199}" type="datetimeFigureOut">
               <a:rPr lang="en-US" smtClean="0"/>
-              <a:t>7/21/2018</a:t>
+              <a:t>7/22/2018</a:t>
             </a:fld>
             <a:endParaRPr lang="en-US" dirty="0"/>
           </a:p>
@@ -1672,7 +1682,7 @@
           <a:p>
             <a:fld id="{349BF3EA-1A78-4F07-BDC0-C8A1BD461199}" type="datetimeFigureOut">
               <a:rPr lang="en-US" smtClean="0"/>
-              <a:t>7/21/2018</a:t>
+              <a:t>7/22/2018</a:t>
             </a:fld>
             <a:endParaRPr lang="en-US" dirty="0"/>
           </a:p>
@@ -2146,7 +2156,7 @@
           <a:p>
             <a:fld id="{349BF3EA-1A78-4F07-BDC0-C8A1BD461199}" type="datetimeFigureOut">
               <a:rPr lang="en-US" smtClean="0"/>
-              <a:t>7/21/2018</a:t>
+              <a:t>7/22/2018</a:t>
             </a:fld>
             <a:endParaRPr lang="en-US" dirty="0"/>
           </a:p>
@@ -2400,7 +2410,7 @@
           <a:p>
             <a:fld id="{349BF3EA-1A78-4F07-BDC0-C8A1BD461199}" type="datetimeFigureOut">
               <a:rPr lang="en-US" smtClean="0"/>
-              <a:t>7/21/2018</a:t>
+              <a:t>7/22/2018</a:t>
             </a:fld>
             <a:endParaRPr lang="en-US" dirty="0"/>
           </a:p>
@@ -2793,7 +2803,7 @@
           <a:p>
             <a:fld id="{349BF3EA-1A78-4F07-BDC0-C8A1BD461199}" type="datetimeFigureOut">
               <a:rPr lang="en-US" smtClean="0"/>
-              <a:t>7/21/2018</a:t>
+              <a:t>7/22/2018</a:t>
             </a:fld>
             <a:endParaRPr lang="en-US" dirty="0"/>
           </a:p>
@@ -2933,7 +2943,7 @@
           <a:p>
             <a:fld id="{349BF3EA-1A78-4F07-BDC0-C8A1BD461199}" type="datetimeFigureOut">
               <a:rPr lang="en-US" smtClean="0"/>
-              <a:t>7/21/2018</a:t>
+              <a:t>7/22/2018</a:t>
             </a:fld>
             <a:endParaRPr lang="en-US" dirty="0"/>
           </a:p>
@@ -3050,7 +3060,7 @@
           <a:p>
             <a:fld id="{349BF3EA-1A78-4F07-BDC0-C8A1BD461199}" type="datetimeFigureOut">
               <a:rPr lang="en-US" smtClean="0"/>
-              <a:t>7/21/2018</a:t>
+              <a:t>7/22/2018</a:t>
             </a:fld>
             <a:endParaRPr lang="en-US" dirty="0"/>
           </a:p>
@@ -3401,7 +3411,7 @@
           <a:p>
             <a:fld id="{349BF3EA-1A78-4F07-BDC0-C8A1BD461199}" type="datetimeFigureOut">
               <a:rPr lang="en-US" smtClean="0"/>
-              <a:t>7/21/2018</a:t>
+              <a:t>7/22/2018</a:t>
             </a:fld>
             <a:endParaRPr lang="en-US" dirty="0"/>
           </a:p>
@@ -3798,7 +3808,7 @@
           <a:p>
             <a:fld id="{349BF3EA-1A78-4F07-BDC0-C8A1BD461199}" type="datetimeFigureOut">
               <a:rPr lang="en-US" smtClean="0"/>
-              <a:t>7/21/2018</a:t>
+              <a:t>7/22/2018</a:t>
             </a:fld>
             <a:endParaRPr lang="en-US" dirty="0"/>
           </a:p>
@@ -4168,7 +4178,7 @@
           <a:p>
             <a:fld id="{349BF3EA-1A78-4F07-BDC0-C8A1BD461199}" type="datetimeFigureOut">
               <a:rPr lang="en-US" smtClean="0"/>
-              <a:t>7/21/2018</a:t>
+              <a:t>7/22/2018</a:t>
             </a:fld>
             <a:endParaRPr lang="en-US" dirty="0"/>
           </a:p>
@@ -4704,6 +4714,676 @@
 </p:sld>
 </file>
 
+<file path=ppt/slides/slide10.xml><?xml version="1.0" encoding="utf-8"?>
+<p:sld xmlns:a="http://schemas.openxmlformats.org/drawingml/2006/main" xmlns:r="http://schemas.openxmlformats.org/officeDocument/2006/relationships" xmlns:p="http://schemas.openxmlformats.org/presentationml/2006/main">
+  <p:cSld>
+    <p:spTree>
+      <p:nvGrpSpPr>
+        <p:cNvPr id="1" name=""/>
+        <p:cNvGrpSpPr/>
+        <p:nvPr/>
+      </p:nvGrpSpPr>
+      <p:grpSpPr>
+        <a:xfrm>
+          <a:off x="0" y="0"/>
+          <a:ext cx="0" cy="0"/>
+          <a:chOff x="0" y="0"/>
+          <a:chExt cx="0" cy="0"/>
+        </a:xfrm>
+      </p:grpSpPr>
+      <p:sp>
+        <p:nvSpPr>
+          <p:cNvPr id="2" name="Title 1"/>
+          <p:cNvSpPr>
+            <a:spLocks noGrp="1"/>
+          </p:cNvSpPr>
+          <p:nvPr>
+            <p:ph type="title"/>
+          </p:nvPr>
+        </p:nvSpPr>
+        <p:spPr/>
+        <p:txBody>
+          <a:bodyPr/>
+          <a:lstStyle/>
+          <a:p>
+            <a:endParaRPr lang="en-US"/>
+          </a:p>
+        </p:txBody>
+      </p:sp>
+      <p:sp>
+        <p:nvSpPr>
+          <p:cNvPr id="3" name="Content Placeholder 2"/>
+          <p:cNvSpPr>
+            <a:spLocks noGrp="1"/>
+          </p:cNvSpPr>
+          <p:nvPr>
+            <p:ph sz="quarter" idx="1"/>
+          </p:nvPr>
+        </p:nvSpPr>
+        <p:spPr/>
+        <p:txBody>
+          <a:bodyPr/>
+          <a:lstStyle/>
+          <a:p>
+            <a:endParaRPr lang="en-US"/>
+          </a:p>
+        </p:txBody>
+      </p:sp>
+    </p:spTree>
+    <p:extLst>
+      <p:ext uri="{BB962C8B-B14F-4D97-AF65-F5344CB8AC3E}">
+        <p14:creationId xmlns:p14="http://schemas.microsoft.com/office/powerpoint/2010/main" val="3754066884"/>
+      </p:ext>
+    </p:extLst>
+  </p:cSld>
+  <p:clrMapOvr>
+    <a:masterClrMapping/>
+  </p:clrMapOvr>
+  <mc:AlternateContent xmlns:mc="http://schemas.openxmlformats.org/markup-compatibility/2006" xmlns:p14="http://schemas.microsoft.com/office/powerpoint/2010/main">
+    <mc:Choice Requires="p14">
+      <p:transition spd="med" p14:dur="700">
+        <p:fade/>
+      </p:transition>
+    </mc:Choice>
+    <mc:Fallback xmlns="">
+      <p:transition spd="med">
+        <p:fade/>
+      </p:transition>
+    </mc:Fallback>
+  </mc:AlternateContent>
+</p:sld>
+</file>
+
+<file path=ppt/slides/slide11.xml><?xml version="1.0" encoding="utf-8"?>
+<p:sld xmlns:a="http://schemas.openxmlformats.org/drawingml/2006/main" xmlns:r="http://schemas.openxmlformats.org/officeDocument/2006/relationships" xmlns:p="http://schemas.openxmlformats.org/presentationml/2006/main">
+  <p:cSld>
+    <p:spTree>
+      <p:nvGrpSpPr>
+        <p:cNvPr id="1" name=""/>
+        <p:cNvGrpSpPr/>
+        <p:nvPr/>
+      </p:nvGrpSpPr>
+      <p:grpSpPr>
+        <a:xfrm>
+          <a:off x="0" y="0"/>
+          <a:ext cx="0" cy="0"/>
+          <a:chOff x="0" y="0"/>
+          <a:chExt cx="0" cy="0"/>
+        </a:xfrm>
+      </p:grpSpPr>
+      <p:sp>
+        <p:nvSpPr>
+          <p:cNvPr id="2" name="Title 1"/>
+          <p:cNvSpPr>
+            <a:spLocks noGrp="1"/>
+          </p:cNvSpPr>
+          <p:nvPr>
+            <p:ph type="title"/>
+          </p:nvPr>
+        </p:nvSpPr>
+        <p:spPr/>
+        <p:txBody>
+          <a:bodyPr/>
+          <a:lstStyle/>
+          <a:p>
+            <a:endParaRPr lang="en-US"/>
+          </a:p>
+        </p:txBody>
+      </p:sp>
+      <p:sp>
+        <p:nvSpPr>
+          <p:cNvPr id="3" name="Content Placeholder 2"/>
+          <p:cNvSpPr>
+            <a:spLocks noGrp="1"/>
+          </p:cNvSpPr>
+          <p:nvPr>
+            <p:ph sz="quarter" idx="1"/>
+          </p:nvPr>
+        </p:nvSpPr>
+        <p:spPr/>
+        <p:txBody>
+          <a:bodyPr/>
+          <a:lstStyle/>
+          <a:p>
+            <a:endParaRPr lang="en-US"/>
+          </a:p>
+        </p:txBody>
+      </p:sp>
+    </p:spTree>
+    <p:extLst>
+      <p:ext uri="{BB962C8B-B14F-4D97-AF65-F5344CB8AC3E}">
+        <p14:creationId xmlns:p14="http://schemas.microsoft.com/office/powerpoint/2010/main" val="3357657668"/>
+      </p:ext>
+    </p:extLst>
+  </p:cSld>
+  <p:clrMapOvr>
+    <a:masterClrMapping/>
+  </p:clrMapOvr>
+  <mc:AlternateContent xmlns:mc="http://schemas.openxmlformats.org/markup-compatibility/2006" xmlns:p14="http://schemas.microsoft.com/office/powerpoint/2010/main">
+    <mc:Choice Requires="p14">
+      <p:transition spd="med" p14:dur="700">
+        <p:fade/>
+      </p:transition>
+    </mc:Choice>
+    <mc:Fallback xmlns="">
+      <p:transition spd="med">
+        <p:fade/>
+      </p:transition>
+    </mc:Fallback>
+  </mc:AlternateContent>
+</p:sld>
+</file>
+
+<file path=ppt/slides/slide12.xml><?xml version="1.0" encoding="utf-8"?>
+<p:sld xmlns:a="http://schemas.openxmlformats.org/drawingml/2006/main" xmlns:r="http://schemas.openxmlformats.org/officeDocument/2006/relationships" xmlns:p="http://schemas.openxmlformats.org/presentationml/2006/main">
+  <p:cSld>
+    <p:spTree>
+      <p:nvGrpSpPr>
+        <p:cNvPr id="1" name=""/>
+        <p:cNvGrpSpPr/>
+        <p:nvPr/>
+      </p:nvGrpSpPr>
+      <p:grpSpPr>
+        <a:xfrm>
+          <a:off x="0" y="0"/>
+          <a:ext cx="0" cy="0"/>
+          <a:chOff x="0" y="0"/>
+          <a:chExt cx="0" cy="0"/>
+        </a:xfrm>
+      </p:grpSpPr>
+      <p:sp>
+        <p:nvSpPr>
+          <p:cNvPr id="2" name="Title 1"/>
+          <p:cNvSpPr>
+            <a:spLocks noGrp="1"/>
+          </p:cNvSpPr>
+          <p:nvPr>
+            <p:ph type="title"/>
+          </p:nvPr>
+        </p:nvSpPr>
+        <p:spPr/>
+        <p:txBody>
+          <a:bodyPr/>
+          <a:lstStyle/>
+          <a:p>
+            <a:r>
+              <a:rPr lang="en-US" dirty="0" smtClean="0"/>
+              <a:t>Project Management</a:t>
+            </a:r>
+            <a:endParaRPr lang="en-US" dirty="0"/>
+          </a:p>
+        </p:txBody>
+      </p:sp>
+      <p:sp>
+        <p:nvSpPr>
+          <p:cNvPr id="3" name="Content Placeholder 2"/>
+          <p:cNvSpPr>
+            <a:spLocks noGrp="1"/>
+          </p:cNvSpPr>
+          <p:nvPr>
+            <p:ph sz="quarter" idx="1"/>
+          </p:nvPr>
+        </p:nvSpPr>
+        <p:spPr/>
+        <p:txBody>
+          <a:bodyPr/>
+          <a:lstStyle/>
+          <a:p>
+            <a:endParaRPr lang="en-US" dirty="0"/>
+          </a:p>
+        </p:txBody>
+      </p:sp>
+    </p:spTree>
+    <p:extLst>
+      <p:ext uri="{BB962C8B-B14F-4D97-AF65-F5344CB8AC3E}">
+        <p14:creationId xmlns:p14="http://schemas.microsoft.com/office/powerpoint/2010/main" val="4022182114"/>
+      </p:ext>
+    </p:extLst>
+  </p:cSld>
+  <p:clrMapOvr>
+    <a:masterClrMapping/>
+  </p:clrMapOvr>
+  <mc:AlternateContent xmlns:mc="http://schemas.openxmlformats.org/markup-compatibility/2006" xmlns:p14="http://schemas.microsoft.com/office/powerpoint/2010/main">
+    <mc:Choice Requires="p14">
+      <p:transition spd="med" p14:dur="700">
+        <p:fade/>
+      </p:transition>
+    </mc:Choice>
+    <mc:Fallback xmlns="">
+      <p:transition spd="med">
+        <p:fade/>
+      </p:transition>
+    </mc:Fallback>
+  </mc:AlternateContent>
+</p:sld>
+</file>
+
+<file path=ppt/slides/slide13.xml><?xml version="1.0" encoding="utf-8"?>
+<p:sld xmlns:a="http://schemas.openxmlformats.org/drawingml/2006/main" xmlns:r="http://schemas.openxmlformats.org/officeDocument/2006/relationships" xmlns:p="http://schemas.openxmlformats.org/presentationml/2006/main">
+  <p:cSld>
+    <p:spTree>
+      <p:nvGrpSpPr>
+        <p:cNvPr id="1" name=""/>
+        <p:cNvGrpSpPr/>
+        <p:nvPr/>
+      </p:nvGrpSpPr>
+      <p:grpSpPr>
+        <a:xfrm>
+          <a:off x="0" y="0"/>
+          <a:ext cx="0" cy="0"/>
+          <a:chOff x="0" y="0"/>
+          <a:chExt cx="0" cy="0"/>
+        </a:xfrm>
+      </p:grpSpPr>
+      <p:sp>
+        <p:nvSpPr>
+          <p:cNvPr id="2" name="Title 1"/>
+          <p:cNvSpPr>
+            <a:spLocks noGrp="1"/>
+          </p:cNvSpPr>
+          <p:nvPr>
+            <p:ph type="title"/>
+          </p:nvPr>
+        </p:nvSpPr>
+        <p:spPr/>
+        <p:txBody>
+          <a:bodyPr/>
+          <a:lstStyle/>
+          <a:p>
+            <a:r>
+              <a:rPr lang="en-US" dirty="0" smtClean="0"/>
+              <a:t>What We Liked</a:t>
+            </a:r>
+            <a:endParaRPr lang="en-US" dirty="0"/>
+          </a:p>
+        </p:txBody>
+      </p:sp>
+      <p:sp>
+        <p:nvSpPr>
+          <p:cNvPr id="3" name="Content Placeholder 2"/>
+          <p:cNvSpPr>
+            <a:spLocks noGrp="1"/>
+          </p:cNvSpPr>
+          <p:nvPr>
+            <p:ph sz="quarter" idx="1"/>
+          </p:nvPr>
+        </p:nvSpPr>
+        <p:spPr/>
+        <p:txBody>
+          <a:bodyPr/>
+          <a:lstStyle/>
+          <a:p>
+            <a:endParaRPr lang="en-US"/>
+          </a:p>
+        </p:txBody>
+      </p:sp>
+    </p:spTree>
+    <p:extLst>
+      <p:ext uri="{BB962C8B-B14F-4D97-AF65-F5344CB8AC3E}">
+        <p14:creationId xmlns:p14="http://schemas.microsoft.com/office/powerpoint/2010/main" val="3466992820"/>
+      </p:ext>
+    </p:extLst>
+  </p:cSld>
+  <p:clrMapOvr>
+    <a:masterClrMapping/>
+  </p:clrMapOvr>
+  <mc:AlternateContent xmlns:mc="http://schemas.openxmlformats.org/markup-compatibility/2006" xmlns:p14="http://schemas.microsoft.com/office/powerpoint/2010/main">
+    <mc:Choice Requires="p14">
+      <p:transition spd="med" p14:dur="700">
+        <p:fade/>
+      </p:transition>
+    </mc:Choice>
+    <mc:Fallback xmlns="">
+      <p:transition spd="med">
+        <p:fade/>
+      </p:transition>
+    </mc:Fallback>
+  </mc:AlternateContent>
+</p:sld>
+</file>
+
+<file path=ppt/slides/slide14.xml><?xml version="1.0" encoding="utf-8"?>
+<p:sld xmlns:a="http://schemas.openxmlformats.org/drawingml/2006/main" xmlns:r="http://schemas.openxmlformats.org/officeDocument/2006/relationships" xmlns:p="http://schemas.openxmlformats.org/presentationml/2006/main">
+  <p:cSld>
+    <p:spTree>
+      <p:nvGrpSpPr>
+        <p:cNvPr id="1" name=""/>
+        <p:cNvGrpSpPr/>
+        <p:nvPr/>
+      </p:nvGrpSpPr>
+      <p:grpSpPr>
+        <a:xfrm>
+          <a:off x="0" y="0"/>
+          <a:ext cx="0" cy="0"/>
+          <a:chOff x="0" y="0"/>
+          <a:chExt cx="0" cy="0"/>
+        </a:xfrm>
+      </p:grpSpPr>
+      <p:sp>
+        <p:nvSpPr>
+          <p:cNvPr id="2" name="Title 1"/>
+          <p:cNvSpPr>
+            <a:spLocks noGrp="1"/>
+          </p:cNvSpPr>
+          <p:nvPr>
+            <p:ph type="title"/>
+          </p:nvPr>
+        </p:nvSpPr>
+        <p:spPr/>
+        <p:txBody>
+          <a:bodyPr/>
+          <a:lstStyle/>
+          <a:p>
+            <a:r>
+              <a:rPr lang="en-US" dirty="0" smtClean="0"/>
+              <a:t>What We Didn’t Like</a:t>
+            </a:r>
+            <a:endParaRPr lang="en-US" dirty="0"/>
+          </a:p>
+        </p:txBody>
+      </p:sp>
+      <p:sp>
+        <p:nvSpPr>
+          <p:cNvPr id="3" name="Content Placeholder 2"/>
+          <p:cNvSpPr>
+            <a:spLocks noGrp="1"/>
+          </p:cNvSpPr>
+          <p:nvPr>
+            <p:ph sz="quarter" idx="1"/>
+          </p:nvPr>
+        </p:nvSpPr>
+        <p:spPr/>
+        <p:txBody>
+          <a:bodyPr/>
+          <a:lstStyle/>
+          <a:p>
+            <a:endParaRPr lang="en-US"/>
+          </a:p>
+        </p:txBody>
+      </p:sp>
+    </p:spTree>
+    <p:extLst>
+      <p:ext uri="{BB962C8B-B14F-4D97-AF65-F5344CB8AC3E}">
+        <p14:creationId xmlns:p14="http://schemas.microsoft.com/office/powerpoint/2010/main" val="893934045"/>
+      </p:ext>
+    </p:extLst>
+  </p:cSld>
+  <p:clrMapOvr>
+    <a:masterClrMapping/>
+  </p:clrMapOvr>
+  <mc:AlternateContent xmlns:mc="http://schemas.openxmlformats.org/markup-compatibility/2006" xmlns:p14="http://schemas.microsoft.com/office/powerpoint/2010/main">
+    <mc:Choice Requires="p14">
+      <p:transition spd="med" p14:dur="700">
+        <p:fade/>
+      </p:transition>
+    </mc:Choice>
+    <mc:Fallback xmlns="">
+      <p:transition spd="med">
+        <p:fade/>
+      </p:transition>
+    </mc:Fallback>
+  </mc:AlternateContent>
+</p:sld>
+</file>
+
+<file path=ppt/slides/slide15.xml><?xml version="1.0" encoding="utf-8"?>
+<p:sld xmlns:a="http://schemas.openxmlformats.org/drawingml/2006/main" xmlns:r="http://schemas.openxmlformats.org/officeDocument/2006/relationships" xmlns:p="http://schemas.openxmlformats.org/presentationml/2006/main">
+  <p:cSld>
+    <p:spTree>
+      <p:nvGrpSpPr>
+        <p:cNvPr id="1" name=""/>
+        <p:cNvGrpSpPr/>
+        <p:nvPr/>
+      </p:nvGrpSpPr>
+      <p:grpSpPr>
+        <a:xfrm>
+          <a:off x="0" y="0"/>
+          <a:ext cx="0" cy="0"/>
+          <a:chOff x="0" y="0"/>
+          <a:chExt cx="0" cy="0"/>
+        </a:xfrm>
+      </p:grpSpPr>
+      <p:sp>
+        <p:nvSpPr>
+          <p:cNvPr id="2" name="Title 1"/>
+          <p:cNvSpPr>
+            <a:spLocks noGrp="1"/>
+          </p:cNvSpPr>
+          <p:nvPr>
+            <p:ph type="title"/>
+          </p:nvPr>
+        </p:nvSpPr>
+        <p:spPr/>
+        <p:txBody>
+          <a:bodyPr>
+            <a:normAutofit/>
+          </a:bodyPr>
+          <a:lstStyle/>
+          <a:p>
+            <a:r>
+              <a:rPr lang="en-US" dirty="0" smtClean="0"/>
+              <a:t>Learning Experience: Continue Doing</a:t>
+            </a:r>
+            <a:endParaRPr lang="en-US" dirty="0"/>
+          </a:p>
+        </p:txBody>
+      </p:sp>
+      <p:sp>
+        <p:nvSpPr>
+          <p:cNvPr id="3" name="Content Placeholder 2"/>
+          <p:cNvSpPr>
+            <a:spLocks noGrp="1"/>
+          </p:cNvSpPr>
+          <p:nvPr>
+            <p:ph sz="quarter" idx="1"/>
+          </p:nvPr>
+        </p:nvSpPr>
+        <p:spPr/>
+        <p:txBody>
+          <a:bodyPr/>
+          <a:lstStyle/>
+          <a:p>
+            <a:endParaRPr lang="en-US"/>
+          </a:p>
+        </p:txBody>
+      </p:sp>
+    </p:spTree>
+    <p:extLst>
+      <p:ext uri="{BB962C8B-B14F-4D97-AF65-F5344CB8AC3E}">
+        <p14:creationId xmlns:p14="http://schemas.microsoft.com/office/powerpoint/2010/main" val="2881193930"/>
+      </p:ext>
+    </p:extLst>
+  </p:cSld>
+  <p:clrMapOvr>
+    <a:masterClrMapping/>
+  </p:clrMapOvr>
+  <mc:AlternateContent xmlns:mc="http://schemas.openxmlformats.org/markup-compatibility/2006" xmlns:p14="http://schemas.microsoft.com/office/powerpoint/2010/main">
+    <mc:Choice Requires="p14">
+      <p:transition spd="med" p14:dur="700">
+        <p:fade/>
+      </p:transition>
+    </mc:Choice>
+    <mc:Fallback xmlns="">
+      <p:transition spd="med">
+        <p:fade/>
+      </p:transition>
+    </mc:Fallback>
+  </mc:AlternateContent>
+</p:sld>
+</file>
+
+<file path=ppt/slides/slide16.xml><?xml version="1.0" encoding="utf-8"?>
+<p:sld xmlns:a="http://schemas.openxmlformats.org/drawingml/2006/main" xmlns:r="http://schemas.openxmlformats.org/officeDocument/2006/relationships" xmlns:p="http://schemas.openxmlformats.org/presentationml/2006/main">
+  <p:cSld>
+    <p:spTree>
+      <p:nvGrpSpPr>
+        <p:cNvPr id="1" name=""/>
+        <p:cNvGrpSpPr/>
+        <p:nvPr/>
+      </p:nvGrpSpPr>
+      <p:grpSpPr>
+        <a:xfrm>
+          <a:off x="0" y="0"/>
+          <a:ext cx="0" cy="0"/>
+          <a:chOff x="0" y="0"/>
+          <a:chExt cx="0" cy="0"/>
+        </a:xfrm>
+      </p:grpSpPr>
+      <p:sp>
+        <p:nvSpPr>
+          <p:cNvPr id="2" name="Title 1"/>
+          <p:cNvSpPr>
+            <a:spLocks noGrp="1"/>
+          </p:cNvSpPr>
+          <p:nvPr>
+            <p:ph type="title"/>
+          </p:nvPr>
+        </p:nvSpPr>
+        <p:spPr/>
+        <p:txBody>
+          <a:bodyPr/>
+          <a:lstStyle/>
+          <a:p>
+            <a:r>
+              <a:rPr lang="en-US" dirty="0"/>
+              <a:t>Learning Experience</a:t>
+            </a:r>
+            <a:r>
+              <a:rPr lang="en-US" dirty="0" smtClean="0"/>
+              <a:t>: Stop Doing</a:t>
+            </a:r>
+            <a:endParaRPr lang="en-US" dirty="0"/>
+          </a:p>
+        </p:txBody>
+      </p:sp>
+      <p:sp>
+        <p:nvSpPr>
+          <p:cNvPr id="3" name="Content Placeholder 2"/>
+          <p:cNvSpPr>
+            <a:spLocks noGrp="1"/>
+          </p:cNvSpPr>
+          <p:nvPr>
+            <p:ph sz="quarter" idx="1"/>
+          </p:nvPr>
+        </p:nvSpPr>
+        <p:spPr/>
+        <p:txBody>
+          <a:bodyPr/>
+          <a:lstStyle/>
+          <a:p>
+            <a:endParaRPr lang="en-US"/>
+          </a:p>
+        </p:txBody>
+      </p:sp>
+    </p:spTree>
+    <p:extLst>
+      <p:ext uri="{BB962C8B-B14F-4D97-AF65-F5344CB8AC3E}">
+        <p14:creationId xmlns:p14="http://schemas.microsoft.com/office/powerpoint/2010/main" val="3943640939"/>
+      </p:ext>
+    </p:extLst>
+  </p:cSld>
+  <p:clrMapOvr>
+    <a:masterClrMapping/>
+  </p:clrMapOvr>
+  <mc:AlternateContent xmlns:mc="http://schemas.openxmlformats.org/markup-compatibility/2006" xmlns:p14="http://schemas.microsoft.com/office/powerpoint/2010/main">
+    <mc:Choice Requires="p14">
+      <p:transition spd="med" p14:dur="700">
+        <p:fade/>
+      </p:transition>
+    </mc:Choice>
+    <mc:Fallback xmlns="">
+      <p:transition spd="med">
+        <p:fade/>
+      </p:transition>
+    </mc:Fallback>
+  </mc:AlternateContent>
+</p:sld>
+</file>
+
+<file path=ppt/slides/slide17.xml><?xml version="1.0" encoding="utf-8"?>
+<p:sld xmlns:a="http://schemas.openxmlformats.org/drawingml/2006/main" xmlns:r="http://schemas.openxmlformats.org/officeDocument/2006/relationships" xmlns:p="http://schemas.openxmlformats.org/presentationml/2006/main">
+  <p:cSld>
+    <p:spTree>
+      <p:nvGrpSpPr>
+        <p:cNvPr id="1" name=""/>
+        <p:cNvGrpSpPr/>
+        <p:nvPr/>
+      </p:nvGrpSpPr>
+      <p:grpSpPr>
+        <a:xfrm>
+          <a:off x="0" y="0"/>
+          <a:ext cx="0" cy="0"/>
+          <a:chOff x="0" y="0"/>
+          <a:chExt cx="0" cy="0"/>
+        </a:xfrm>
+      </p:grpSpPr>
+      <p:sp>
+        <p:nvSpPr>
+          <p:cNvPr id="2" name="Title 1"/>
+          <p:cNvSpPr>
+            <a:spLocks noGrp="1"/>
+          </p:cNvSpPr>
+          <p:nvPr>
+            <p:ph type="title"/>
+          </p:nvPr>
+        </p:nvSpPr>
+        <p:spPr/>
+        <p:txBody>
+          <a:bodyPr/>
+          <a:lstStyle/>
+          <a:p>
+            <a:r>
+              <a:rPr lang="en-US" dirty="0" smtClean="0"/>
+              <a:t>Things We Wish We Could Have Done</a:t>
+            </a:r>
+            <a:endParaRPr lang="en-US" dirty="0"/>
+          </a:p>
+        </p:txBody>
+      </p:sp>
+      <p:sp>
+        <p:nvSpPr>
+          <p:cNvPr id="3" name="Content Placeholder 2"/>
+          <p:cNvSpPr>
+            <a:spLocks noGrp="1"/>
+          </p:cNvSpPr>
+          <p:nvPr>
+            <p:ph sz="quarter" idx="1"/>
+          </p:nvPr>
+        </p:nvSpPr>
+        <p:spPr/>
+        <p:txBody>
+          <a:bodyPr/>
+          <a:lstStyle/>
+          <a:p>
+            <a:endParaRPr lang="en-US"/>
+          </a:p>
+        </p:txBody>
+      </p:sp>
+    </p:spTree>
+    <p:extLst>
+      <p:ext uri="{BB962C8B-B14F-4D97-AF65-F5344CB8AC3E}">
+        <p14:creationId xmlns:p14="http://schemas.microsoft.com/office/powerpoint/2010/main" val="1981294728"/>
+      </p:ext>
+    </p:extLst>
+  </p:cSld>
+  <p:clrMapOvr>
+    <a:masterClrMapping/>
+  </p:clrMapOvr>
+  <mc:AlternateContent xmlns:mc="http://schemas.openxmlformats.org/markup-compatibility/2006" xmlns:p14="http://schemas.microsoft.com/office/powerpoint/2010/main">
+    <mc:Choice Requires="p14">
+      <p:transition spd="med" p14:dur="700">
+        <p:fade/>
+      </p:transition>
+    </mc:Choice>
+    <mc:Fallback xmlns="">
+      <p:transition spd="med">
+        <p:fade/>
+      </p:transition>
+    </mc:Fallback>
+  </mc:AlternateContent>
+</p:sld>
+</file>
+
 <file path=ppt/slides/slide2.xml><?xml version="1.0" encoding="utf-8"?>
 <p:sld xmlns:a="http://schemas.openxmlformats.org/drawingml/2006/main" xmlns:r="http://schemas.openxmlformats.org/officeDocument/2006/relationships" xmlns:p="http://schemas.openxmlformats.org/presentationml/2006/main">
   <p:cSld>
@@ -5397,6 +6077,203 @@
     <p:extLst>
       <p:ext uri="{BB962C8B-B14F-4D97-AF65-F5344CB8AC3E}">
         <p14:creationId xmlns:p14="http://schemas.microsoft.com/office/powerpoint/2010/main" val="4141198923"/>
+      </p:ext>
+    </p:extLst>
+  </p:cSld>
+  <p:clrMapOvr>
+    <a:masterClrMapping/>
+  </p:clrMapOvr>
+  <mc:AlternateContent xmlns:mc="http://schemas.openxmlformats.org/markup-compatibility/2006" xmlns:p14="http://schemas.microsoft.com/office/powerpoint/2010/main">
+    <mc:Choice Requires="p14">
+      <p:transition spd="med" p14:dur="700">
+        <p:fade/>
+      </p:transition>
+    </mc:Choice>
+    <mc:Fallback xmlns="">
+      <p:transition spd="med">
+        <p:fade/>
+      </p:transition>
+    </mc:Fallback>
+  </mc:AlternateContent>
+</p:sld>
+</file>
+
+<file path=ppt/slides/slide8.xml><?xml version="1.0" encoding="utf-8"?>
+<p:sld xmlns:a="http://schemas.openxmlformats.org/drawingml/2006/main" xmlns:r="http://schemas.openxmlformats.org/officeDocument/2006/relationships" xmlns:p="http://schemas.openxmlformats.org/presentationml/2006/main">
+  <p:cSld>
+    <p:spTree>
+      <p:nvGrpSpPr>
+        <p:cNvPr id="1" name=""/>
+        <p:cNvGrpSpPr/>
+        <p:nvPr/>
+      </p:nvGrpSpPr>
+      <p:grpSpPr>
+        <a:xfrm>
+          <a:off x="0" y="0"/>
+          <a:ext cx="0" cy="0"/>
+          <a:chOff x="0" y="0"/>
+          <a:chExt cx="0" cy="0"/>
+        </a:xfrm>
+      </p:grpSpPr>
+      <p:sp>
+        <p:nvSpPr>
+          <p:cNvPr id="2" name="Title 1"/>
+          <p:cNvSpPr>
+            <a:spLocks noGrp="1"/>
+          </p:cNvSpPr>
+          <p:nvPr>
+            <p:ph type="title"/>
+          </p:nvPr>
+        </p:nvSpPr>
+        <p:spPr/>
+        <p:txBody>
+          <a:bodyPr/>
+          <a:lstStyle/>
+          <a:p>
+            <a:endParaRPr lang="en-US"/>
+          </a:p>
+        </p:txBody>
+      </p:sp>
+      <p:sp>
+        <p:nvSpPr>
+          <p:cNvPr id="3" name="Content Placeholder 2"/>
+          <p:cNvSpPr>
+            <a:spLocks noGrp="1"/>
+          </p:cNvSpPr>
+          <p:nvPr>
+            <p:ph sz="quarter" idx="1"/>
+          </p:nvPr>
+        </p:nvSpPr>
+        <p:spPr/>
+        <p:txBody>
+          <a:bodyPr/>
+          <a:lstStyle/>
+          <a:p>
+            <a:endParaRPr lang="en-US"/>
+          </a:p>
+        </p:txBody>
+      </p:sp>
+    </p:spTree>
+    <p:extLst>
+      <p:ext uri="{BB962C8B-B14F-4D97-AF65-F5344CB8AC3E}">
+        <p14:creationId xmlns:p14="http://schemas.microsoft.com/office/powerpoint/2010/main" val="3971609679"/>
+      </p:ext>
+    </p:extLst>
+  </p:cSld>
+  <p:clrMapOvr>
+    <a:masterClrMapping/>
+  </p:clrMapOvr>
+  <mc:AlternateContent xmlns:mc="http://schemas.openxmlformats.org/markup-compatibility/2006" xmlns:p14="http://schemas.microsoft.com/office/powerpoint/2010/main">
+    <mc:Choice Requires="p14">
+      <p:transition spd="med" p14:dur="700">
+        <p:fade/>
+      </p:transition>
+    </mc:Choice>
+    <mc:Fallback xmlns="">
+      <p:transition spd="med">
+        <p:fade/>
+      </p:transition>
+    </mc:Fallback>
+  </mc:AlternateContent>
+</p:sld>
+</file>
+
+<file path=ppt/slides/slide9.xml><?xml version="1.0" encoding="utf-8"?>
+<p:sld xmlns:a="http://schemas.openxmlformats.org/drawingml/2006/main" xmlns:r="http://schemas.openxmlformats.org/officeDocument/2006/relationships" xmlns:p="http://schemas.openxmlformats.org/presentationml/2006/main">
+  <p:cSld>
+    <p:spTree>
+      <p:nvGrpSpPr>
+        <p:cNvPr id="1" name=""/>
+        <p:cNvGrpSpPr/>
+        <p:nvPr/>
+      </p:nvGrpSpPr>
+      <p:grpSpPr>
+        <a:xfrm>
+          <a:off x="0" y="0"/>
+          <a:ext cx="0" cy="0"/>
+          <a:chOff x="0" y="0"/>
+          <a:chExt cx="0" cy="0"/>
+        </a:xfrm>
+      </p:grpSpPr>
+      <p:sp>
+        <p:nvSpPr>
+          <p:cNvPr id="2" name="Title 1"/>
+          <p:cNvSpPr>
+            <a:spLocks noGrp="1"/>
+          </p:cNvSpPr>
+          <p:nvPr>
+            <p:ph type="title"/>
+          </p:nvPr>
+        </p:nvSpPr>
+        <p:spPr/>
+        <p:txBody>
+          <a:bodyPr/>
+          <a:lstStyle/>
+          <a:p>
+            <a:r>
+              <a:rPr lang="en-US" dirty="0" smtClean="0"/>
+              <a:t>Technology Used</a:t>
+            </a:r>
+            <a:endParaRPr lang="en-US" dirty="0"/>
+          </a:p>
+        </p:txBody>
+      </p:sp>
+      <p:sp>
+        <p:nvSpPr>
+          <p:cNvPr id="3" name="Content Placeholder 2"/>
+          <p:cNvSpPr>
+            <a:spLocks noGrp="1"/>
+          </p:cNvSpPr>
+          <p:nvPr>
+            <p:ph sz="quarter" idx="1"/>
+          </p:nvPr>
+        </p:nvSpPr>
+        <p:spPr/>
+        <p:txBody>
+          <a:bodyPr/>
+          <a:lstStyle/>
+          <a:p>
+            <a:r>
+              <a:rPr lang="en-US" dirty="0" err="1" smtClean="0"/>
+              <a:t>Git</a:t>
+            </a:r>
+            <a:r>
+              <a:rPr lang="en-US" dirty="0" smtClean="0"/>
+              <a:t>/GitHub</a:t>
+            </a:r>
+          </a:p>
+          <a:p>
+            <a:r>
+              <a:rPr lang="en-US" dirty="0" smtClean="0"/>
+              <a:t>Django</a:t>
+            </a:r>
+          </a:p>
+          <a:p>
+            <a:r>
+              <a:rPr lang="en-US" dirty="0" smtClean="0"/>
+              <a:t>React Native</a:t>
+            </a:r>
+          </a:p>
+          <a:p>
+            <a:r>
+              <a:rPr lang="en-US" dirty="0" smtClean="0"/>
+              <a:t>Adobe XD</a:t>
+            </a:r>
+            <a:r>
+              <a:rPr lang="en-US" dirty="0"/>
+              <a:t> </a:t>
+            </a:r>
+            <a:r>
+              <a:rPr lang="en-US" dirty="0" smtClean="0"/>
+              <a:t>(UI)</a:t>
+            </a:r>
+          </a:p>
+        </p:txBody>
+      </p:sp>
+    </p:spTree>
+    <p:extLst>
+      <p:ext uri="{BB962C8B-B14F-4D97-AF65-F5344CB8AC3E}">
+        <p14:creationId xmlns:p14="http://schemas.microsoft.com/office/powerpoint/2010/main" val="3673150577"/>
       </p:ext>
     </p:extLst>
   </p:cSld>

</xml_diff>